<commit_message>
doc: add istio doc
Signed-off-by: huoqifeng <huoqif@cn.ibm.com>
</commit_message>
<xml_diff>
--- a/k8s/Istio-IKS.pptx
+++ b/k8s/Istio-IKS.pptx
@@ -27,8 +27,7 @@
     <p:sldId id="275" r:id="rId21"/>
     <p:sldId id="273" r:id="rId22"/>
     <p:sldId id="267" r:id="rId23"/>
-    <p:sldId id="268" r:id="rId24"/>
-    <p:sldId id="274" r:id="rId25"/>
+    <p:sldId id="274" r:id="rId24"/>
   </p:sldIdLst>
   <p:sldSz cx="12192000" cy="6858000"/>
   <p:notesSz cx="6858000" cy="9144000"/>
@@ -127,6 +126,11 @@
       </a:defRPr>
     </a:lvl9pPr>
   </p:defaultTextStyle>
+  <p:extLst>
+    <p:ext uri="{EFAFB233-063F-42B5-8137-9DF3F51BA10A}">
+      <p15:sldGuideLst xmlns:p15="http://schemas.microsoft.com/office/powerpoint/2012/main"/>
+    </p:ext>
+  </p:extLst>
 </p:presentation>
 </file>
 
@@ -279,7 +283,7 @@
           <a:p>
             <a:fld id="{0CC79A4C-16A3-4746-86E6-D3D7082497B4}" type="datetimeFigureOut">
               <a:rPr lang="en-CN" smtClean="0"/>
-              <a:t>2022/6/1</a:t>
+              <a:t>2022/6/8</a:t>
             </a:fld>
             <a:endParaRPr lang="en-CN"/>
           </a:p>
@@ -479,7 +483,7 @@
           <a:p>
             <a:fld id="{0CC79A4C-16A3-4746-86E6-D3D7082497B4}" type="datetimeFigureOut">
               <a:rPr lang="en-CN" smtClean="0"/>
-              <a:t>2022/6/1</a:t>
+              <a:t>2022/6/8</a:t>
             </a:fld>
             <a:endParaRPr lang="en-CN"/>
           </a:p>
@@ -689,7 +693,7 @@
           <a:p>
             <a:fld id="{0CC79A4C-16A3-4746-86E6-D3D7082497B4}" type="datetimeFigureOut">
               <a:rPr lang="en-CN" smtClean="0"/>
-              <a:t>2022/6/1</a:t>
+              <a:t>2022/6/8</a:t>
             </a:fld>
             <a:endParaRPr lang="en-CN"/>
           </a:p>
@@ -889,7 +893,7 @@
           <a:p>
             <a:fld id="{0CC79A4C-16A3-4746-86E6-D3D7082497B4}" type="datetimeFigureOut">
               <a:rPr lang="en-CN" smtClean="0"/>
-              <a:t>2022/6/1</a:t>
+              <a:t>2022/6/8</a:t>
             </a:fld>
             <a:endParaRPr lang="en-CN"/>
           </a:p>
@@ -1165,7 +1169,7 @@
           <a:p>
             <a:fld id="{0CC79A4C-16A3-4746-86E6-D3D7082497B4}" type="datetimeFigureOut">
               <a:rPr lang="en-CN" smtClean="0"/>
-              <a:t>2022/6/1</a:t>
+              <a:t>2022/6/8</a:t>
             </a:fld>
             <a:endParaRPr lang="en-CN"/>
           </a:p>
@@ -1433,7 +1437,7 @@
           <a:p>
             <a:fld id="{0CC79A4C-16A3-4746-86E6-D3D7082497B4}" type="datetimeFigureOut">
               <a:rPr lang="en-CN" smtClean="0"/>
-              <a:t>2022/6/1</a:t>
+              <a:t>2022/6/8</a:t>
             </a:fld>
             <a:endParaRPr lang="en-CN"/>
           </a:p>
@@ -1848,7 +1852,7 @@
           <a:p>
             <a:fld id="{0CC79A4C-16A3-4746-86E6-D3D7082497B4}" type="datetimeFigureOut">
               <a:rPr lang="en-CN" smtClean="0"/>
-              <a:t>2022/6/1</a:t>
+              <a:t>2022/6/8</a:t>
             </a:fld>
             <a:endParaRPr lang="en-CN"/>
           </a:p>
@@ -1990,7 +1994,7 @@
           <a:p>
             <a:fld id="{0CC79A4C-16A3-4746-86E6-D3D7082497B4}" type="datetimeFigureOut">
               <a:rPr lang="en-CN" smtClean="0"/>
-              <a:t>2022/6/1</a:t>
+              <a:t>2022/6/8</a:t>
             </a:fld>
             <a:endParaRPr lang="en-CN"/>
           </a:p>
@@ -2103,7 +2107,7 @@
           <a:p>
             <a:fld id="{0CC79A4C-16A3-4746-86E6-D3D7082497B4}" type="datetimeFigureOut">
               <a:rPr lang="en-CN" smtClean="0"/>
-              <a:t>2022/6/1</a:t>
+              <a:t>2022/6/8</a:t>
             </a:fld>
             <a:endParaRPr lang="en-CN"/>
           </a:p>
@@ -2416,7 +2420,7 @@
           <a:p>
             <a:fld id="{0CC79A4C-16A3-4746-86E6-D3D7082497B4}" type="datetimeFigureOut">
               <a:rPr lang="en-CN" smtClean="0"/>
-              <a:t>2022/6/1</a:t>
+              <a:t>2022/6/8</a:t>
             </a:fld>
             <a:endParaRPr lang="en-CN"/>
           </a:p>
@@ -2705,7 +2709,7 @@
           <a:p>
             <a:fld id="{0CC79A4C-16A3-4746-86E6-D3D7082497B4}" type="datetimeFigureOut">
               <a:rPr lang="en-CN" smtClean="0"/>
-              <a:t>2022/6/1</a:t>
+              <a:t>2022/6/8</a:t>
             </a:fld>
             <a:endParaRPr lang="en-CN"/>
           </a:p>
@@ -2948,7 +2952,7 @@
           <a:p>
             <a:fld id="{0CC79A4C-16A3-4746-86E6-D3D7082497B4}" type="datetimeFigureOut">
               <a:rPr lang="en-CN" smtClean="0"/>
-              <a:t>2022/6/1</a:t>
+              <a:t>2022/6/8</a:t>
             </a:fld>
             <a:endParaRPr lang="en-CN"/>
           </a:p>
@@ -5615,176 +5619,6 @@
           <a:chExt cx="0" cy="0"/>
         </a:xfrm>
       </p:grpSpPr>
-      <p:sp>
-        <p:nvSpPr>
-          <p:cNvPr id="2" name="Title 1">
-            <a:extLst>
-              <a:ext uri="{FF2B5EF4-FFF2-40B4-BE49-F238E27FC236}">
-                <a16:creationId xmlns:a16="http://schemas.microsoft.com/office/drawing/2014/main" id="{9DAB60C2-9A59-706C-D7B3-2A729A302E24}"/>
-              </a:ext>
-            </a:extLst>
-          </p:cNvPr>
-          <p:cNvSpPr>
-            <a:spLocks noGrp="1"/>
-          </p:cNvSpPr>
-          <p:nvPr>
-            <p:ph type="title"/>
-          </p:nvPr>
-        </p:nvSpPr>
-        <p:spPr/>
-        <p:txBody>
-          <a:bodyPr/>
-          <a:lstStyle/>
-          <a:p>
-            <a:r>
-              <a:rPr lang="en-CN" dirty="0"/>
-              <a:t>Istio in CC and Peer Pod?</a:t>
-            </a:r>
-          </a:p>
-        </p:txBody>
-      </p:sp>
-      <p:sp>
-        <p:nvSpPr>
-          <p:cNvPr id="3" name="Content Placeholder 2">
-            <a:extLst>
-              <a:ext uri="{FF2B5EF4-FFF2-40B4-BE49-F238E27FC236}">
-                <a16:creationId xmlns:a16="http://schemas.microsoft.com/office/drawing/2014/main" id="{281F8568-E472-BB50-383A-D6E83913B1C0}"/>
-              </a:ext>
-            </a:extLst>
-          </p:cNvPr>
-          <p:cNvSpPr>
-            <a:spLocks noGrp="1"/>
-          </p:cNvSpPr>
-          <p:nvPr>
-            <p:ph idx="1"/>
-          </p:nvPr>
-        </p:nvSpPr>
-        <p:spPr/>
-        <p:txBody>
-          <a:bodyPr>
-            <a:normAutofit lnSpcReduction="10000"/>
-          </a:bodyPr>
-          <a:lstStyle/>
-          <a:p>
-            <a:r>
-              <a:rPr lang="en-CN" dirty="0"/>
-              <a:t>Requirements</a:t>
-            </a:r>
-          </a:p>
-          <a:p>
-            <a:pPr lvl="1"/>
-            <a:r>
-              <a:rPr lang="en-CN" dirty="0"/>
-              <a:t>Istio multi-arch images</a:t>
-            </a:r>
-          </a:p>
-          <a:p>
-            <a:pPr lvl="1"/>
-            <a:r>
-              <a:rPr lang="en-CN" dirty="0"/>
-              <a:t>Ability to i</a:t>
-            </a:r>
-            <a:r>
-              <a:rPr lang="en-US" dirty="0"/>
-              <a:t>n</a:t>
-            </a:r>
-            <a:r>
-              <a:rPr lang="en-CN" dirty="0"/>
-              <a:t>ject sidecar to Peer Pod</a:t>
-            </a:r>
-          </a:p>
-          <a:p>
-            <a:pPr lvl="2"/>
-            <a:r>
-              <a:rPr lang="en-CN" dirty="0"/>
-              <a:t>Customize Envoy Proxy image URL</a:t>
-            </a:r>
-          </a:p>
-          <a:p>
-            <a:pPr lvl="2"/>
-            <a:r>
-              <a:rPr lang="en-CN" dirty="0"/>
-              <a:t> TEE Contract</a:t>
-            </a:r>
-          </a:p>
-          <a:p>
-            <a:pPr lvl="1"/>
-            <a:r>
-              <a:rPr lang="en-CN" dirty="0"/>
-              <a:t>Push the configure to E</a:t>
-            </a:r>
-            <a:r>
-              <a:rPr lang="en-US" dirty="0"/>
-              <a:t>n</a:t>
-            </a:r>
-            <a:r>
-              <a:rPr lang="en-CN" dirty="0"/>
-              <a:t>voy proxy in Peer Pod</a:t>
-            </a:r>
-          </a:p>
-          <a:p>
-            <a:pPr lvl="1"/>
-            <a:r>
-              <a:rPr lang="en-CN" dirty="0"/>
-              <a:t>Micro service and DNS support in Peer Pod</a:t>
-            </a:r>
-          </a:p>
-          <a:p>
-            <a:pPr lvl="1"/>
-            <a:endParaRPr lang="en-CN" dirty="0"/>
-          </a:p>
-          <a:p>
-            <a:r>
-              <a:rPr lang="en-CN" dirty="0"/>
-              <a:t>CC considerations</a:t>
-            </a:r>
-          </a:p>
-          <a:p>
-            <a:pPr lvl="1"/>
-            <a:r>
-              <a:rPr lang="en-CN" dirty="0"/>
-              <a:t>How to inject sidecar in Peer Pod securely</a:t>
-            </a:r>
-          </a:p>
-          <a:p>
-            <a:pPr lvl="1"/>
-            <a:r>
-              <a:rPr lang="en-CN" dirty="0"/>
-              <a:t>Security, CA/TLS keys management in Istio control plane </a:t>
-            </a:r>
-          </a:p>
-        </p:txBody>
-      </p:sp>
-    </p:spTree>
-    <p:extLst>
-      <p:ext uri="{BB962C8B-B14F-4D97-AF65-F5344CB8AC3E}">
-        <p14:creationId xmlns:p14="http://schemas.microsoft.com/office/powerpoint/2010/main" val="4131920920"/>
-      </p:ext>
-    </p:extLst>
-  </p:cSld>
-  <p:clrMapOvr>
-    <a:masterClrMapping/>
-  </p:clrMapOvr>
-</p:sld>
-</file>
-
-<file path=ppt/slides/slide24.xml><?xml version="1.0" encoding="utf-8"?>
-<p:sld xmlns:a="http://schemas.openxmlformats.org/drawingml/2006/main" xmlns:r="http://schemas.openxmlformats.org/officeDocument/2006/relationships" xmlns:p="http://schemas.openxmlformats.org/presentationml/2006/main">
-  <p:cSld>
-    <p:spTree>
-      <p:nvGrpSpPr>
-        <p:cNvPr id="1" name=""/>
-        <p:cNvGrpSpPr/>
-        <p:nvPr/>
-      </p:nvGrpSpPr>
-      <p:grpSpPr>
-        <a:xfrm>
-          <a:off x="0" y="0"/>
-          <a:ext cx="0" cy="0"/>
-          <a:chOff x="0" y="0"/>
-          <a:chExt cx="0" cy="0"/>
-        </a:xfrm>
-      </p:grpSpPr>
       <p:pic>
         <p:nvPicPr>
           <p:cNvPr id="5" name="Picture 4">
@@ -5838,7 +5672,7 @@
           <a:p>
             <a:fld id="{88D31200-A724-8747-9B11-11B6AC230EC8}" type="slidenum">
               <a:rPr lang="en-CN" smtClean="0"/>
-              <a:t>24</a:t>
+              <a:t>23</a:t>
             </a:fld>
             <a:endParaRPr lang="en-CN"/>
           </a:p>

</xml_diff>